<commit_message>
Feat(Trabalho Academia e Exercicio): Realização de alterações no trabalho e finalização do exercicio de ER Banco de dados
</commit_message>
<xml_diff>
--- a/Banco de Dados - Modulo 2/Trabalho Modelagem Academia/Apresentação Modelagem Academia.pptx
+++ b/Banco de Dados - Modulo 2/Trabalho Modelagem Academia/Apresentação Modelagem Academia.pptx
@@ -15,6 +15,9 @@
     <p:sldId id="260" r:id="rId9"/>
     <p:sldId id="261" r:id="rId10"/>
     <p:sldId id="262" r:id="rId11"/>
+    <p:sldId id="263" r:id="rId12"/>
+    <p:sldId id="264" r:id="rId13"/>
+    <p:sldId id="265" r:id="rId14"/>
   </p:sldIdLst>
   <p:sldSz cy="5143500" cx="9144000"/>
   <p:notesSz cx="6858000" cy="9144000"/>
@@ -467,6 +470,101 @@
 </p:notes>
 </file>
 
+<file path=ppt/notesSlides/notesSlide10.xml><?xml version="1.0" encoding="utf-8"?>
+<p:notes xmlns:a="http://schemas.openxmlformats.org/drawingml/2006/main" xmlns:r="http://schemas.openxmlformats.org/officeDocument/2006/relationships" xmlns:mc="http://schemas.openxmlformats.org/markup-compatibility/2006" xmlns:mv="urn:schemas-microsoft-com:mac:vml" xmlns:p="http://schemas.openxmlformats.org/presentationml/2006/main" xmlns:c="http://schemas.openxmlformats.org/drawingml/2006/chart" xmlns:dgm="http://schemas.openxmlformats.org/drawingml/2006/diagram" xmlns:o="urn:schemas-microsoft-com:office:office" xmlns:v="urn:schemas-microsoft-com:vml" xmlns:pvml="urn:schemas-microsoft-com:office:powerpoint" xmlns:com="http://schemas.openxmlformats.org/drawingml/2006/compatibility" xmlns:p14="http://schemas.microsoft.com/office/powerpoint/2010/main" showMasterPhAnim="0" showMasterSp="0">
+  <p:cSld>
+    <p:spTree>
+      <p:nvGrpSpPr>
+        <p:cNvPr id="94" name="Shape 94"/>
+        <p:cNvGrpSpPr/>
+        <p:nvPr/>
+      </p:nvGrpSpPr>
+      <p:grpSpPr>
+        <a:xfrm>
+          <a:off x="0" y="0"/>
+          <a:ext cx="0" cy="0"/>
+          <a:chOff x="0" y="0"/>
+          <a:chExt cx="0" cy="0"/>
+        </a:xfrm>
+      </p:grpSpPr>
+      <p:sp>
+        <p:nvSpPr>
+          <p:cNvPr id="95" name="Shape 95"/>
+          <p:cNvSpPr/>
+          <p:nvPr>
+            <p:ph idx="2" type="sldImg"/>
+          </p:nvPr>
+        </p:nvSpPr>
+        <p:spPr>
+          <a:xfrm>
+            <a:off x="381187" y="685800"/>
+            <a:ext cx="6096299" cy="3429000"/>
+          </a:xfrm>
+          <a:custGeom>
+            <a:pathLst>
+              <a:path extrusionOk="0" h="120000" w="120000">
+                <a:moveTo>
+                  <a:pt x="0" y="0"/>
+                </a:moveTo>
+                <a:lnTo>
+                  <a:pt x="120000" y="0"/>
+                </a:lnTo>
+                <a:lnTo>
+                  <a:pt x="120000" y="120000"/>
+                </a:lnTo>
+                <a:lnTo>
+                  <a:pt x="0" y="120000"/>
+                </a:lnTo>
+                <a:close/>
+              </a:path>
+            </a:pathLst>
+          </a:custGeom>
+        </p:spPr>
+      </p:sp>
+      <p:sp>
+        <p:nvSpPr>
+          <p:cNvPr id="96" name="Shape 96"/>
+          <p:cNvSpPr txBox="1"/>
+          <p:nvPr>
+            <p:ph idx="1" type="body"/>
+          </p:nvPr>
+        </p:nvSpPr>
+        <p:spPr>
+          <a:xfrm>
+            <a:off x="685800" y="4343400"/>
+            <a:ext cx="5486399" cy="4114800"/>
+          </a:xfrm>
+          <a:prstGeom prst="rect">
+            <a:avLst/>
+          </a:prstGeom>
+        </p:spPr>
+        <p:txBody>
+          <a:bodyPr anchorCtr="0" anchor="t" bIns="91425" lIns="91425" rIns="91425" tIns="91425">
+            <a:noAutofit/>
+          </a:bodyPr>
+          <a:lstStyle/>
+          <a:p>
+            <a:pPr lvl="0">
+              <a:spcBef>
+                <a:spcPts val="0"/>
+              </a:spcBef>
+              <a:buNone/>
+            </a:pPr>
+            <a:r>
+              <a:t/>
+            </a:r>
+            <a:endParaRPr/>
+          </a:p>
+        </p:txBody>
+      </p:sp>
+    </p:spTree>
+  </p:cSld>
+  <p:clrMapOvr>
+    <a:masterClrMapping/>
+  </p:clrMapOvr>
+</p:notes>
+</file>
+
 <file path=ppt/notesSlides/notesSlide2.xml><?xml version="1.0" encoding="utf-8"?>
 <p:notes xmlns:a="http://schemas.openxmlformats.org/drawingml/2006/main" xmlns:r="http://schemas.openxmlformats.org/officeDocument/2006/relationships" xmlns:mc="http://schemas.openxmlformats.org/markup-compatibility/2006" xmlns:mv="urn:schemas-microsoft-com:mac:vml" xmlns:p="http://schemas.openxmlformats.org/presentationml/2006/main" xmlns:c="http://schemas.openxmlformats.org/drawingml/2006/chart" xmlns:dgm="http://schemas.openxmlformats.org/drawingml/2006/diagram" xmlns:o="urn:schemas-microsoft-com:office:office" xmlns:v="urn:schemas-microsoft-com:vml" xmlns:pvml="urn:schemas-microsoft-com:office:powerpoint" xmlns:com="http://schemas.openxmlformats.org/drawingml/2006/compatibility" xmlns:p14="http://schemas.microsoft.com/office/powerpoint/2010/main" showMasterPhAnim="0" showMasterSp="0">
   <p:cSld>
@@ -1004,7 +1102,7 @@
         <p:spPr>
           <a:xfrm>
             <a:off x="685800" y="4343400"/>
-            <a:ext cx="5486399" cy="4114800"/>
+            <a:ext cx="5486400" cy="4114800"/>
           </a:xfrm>
           <a:prstGeom prst="rect">
             <a:avLst/>
@@ -1017,6 +1115,196 @@
           <a:lstStyle/>
           <a:p>
             <a:pPr lvl="0">
+              <a:spcBef>
+                <a:spcPts val="0"/>
+              </a:spcBef>
+              <a:buNone/>
+            </a:pPr>
+            <a:r>
+              <a:t/>
+            </a:r>
+            <a:endParaRPr/>
+          </a:p>
+        </p:txBody>
+      </p:sp>
+    </p:spTree>
+  </p:cSld>
+  <p:clrMapOvr>
+    <a:masterClrMapping/>
+  </p:clrMapOvr>
+</p:notes>
+</file>
+
+<file path=ppt/notesSlides/notesSlide8.xml><?xml version="1.0" encoding="utf-8"?>
+<p:notes xmlns:a="http://schemas.openxmlformats.org/drawingml/2006/main" xmlns:r="http://schemas.openxmlformats.org/officeDocument/2006/relationships" xmlns:mc="http://schemas.openxmlformats.org/markup-compatibility/2006" xmlns:mv="urn:schemas-microsoft-com:mac:vml" xmlns:p="http://schemas.openxmlformats.org/presentationml/2006/main" xmlns:c="http://schemas.openxmlformats.org/drawingml/2006/chart" xmlns:dgm="http://schemas.openxmlformats.org/drawingml/2006/diagram" xmlns:o="urn:schemas-microsoft-com:office:office" xmlns:v="urn:schemas-microsoft-com:vml" xmlns:pvml="urn:schemas-microsoft-com:office:powerpoint" xmlns:com="http://schemas.openxmlformats.org/drawingml/2006/compatibility" xmlns:p14="http://schemas.microsoft.com/office/powerpoint/2010/main" showMasterPhAnim="0" showMasterSp="0">
+  <p:cSld>
+    <p:spTree>
+      <p:nvGrpSpPr>
+        <p:cNvPr id="80" name="Shape 80"/>
+        <p:cNvGrpSpPr/>
+        <p:nvPr/>
+      </p:nvGrpSpPr>
+      <p:grpSpPr>
+        <a:xfrm>
+          <a:off x="0" y="0"/>
+          <a:ext cx="0" cy="0"/>
+          <a:chOff x="0" y="0"/>
+          <a:chExt cx="0" cy="0"/>
+        </a:xfrm>
+      </p:grpSpPr>
+      <p:sp>
+        <p:nvSpPr>
+          <p:cNvPr id="81" name="Shape 81"/>
+          <p:cNvSpPr/>
+          <p:nvPr>
+            <p:ph idx="2" type="sldImg"/>
+          </p:nvPr>
+        </p:nvSpPr>
+        <p:spPr>
+          <a:xfrm>
+            <a:off x="381187" y="685800"/>
+            <a:ext cx="6096299" cy="3429000"/>
+          </a:xfrm>
+          <a:custGeom>
+            <a:pathLst>
+              <a:path extrusionOk="0" h="120000" w="120000">
+                <a:moveTo>
+                  <a:pt x="0" y="0"/>
+                </a:moveTo>
+                <a:lnTo>
+                  <a:pt x="120000" y="0"/>
+                </a:lnTo>
+                <a:lnTo>
+                  <a:pt x="120000" y="120000"/>
+                </a:lnTo>
+                <a:lnTo>
+                  <a:pt x="0" y="120000"/>
+                </a:lnTo>
+                <a:close/>
+              </a:path>
+            </a:pathLst>
+          </a:custGeom>
+        </p:spPr>
+      </p:sp>
+      <p:sp>
+        <p:nvSpPr>
+          <p:cNvPr id="82" name="Shape 82"/>
+          <p:cNvSpPr txBox="1"/>
+          <p:nvPr>
+            <p:ph idx="1" type="body"/>
+          </p:nvPr>
+        </p:nvSpPr>
+        <p:spPr>
+          <a:xfrm>
+            <a:off x="685800" y="4343400"/>
+            <a:ext cx="5486400" cy="4114800"/>
+          </a:xfrm>
+          <a:prstGeom prst="rect">
+            <a:avLst/>
+          </a:prstGeom>
+        </p:spPr>
+        <p:txBody>
+          <a:bodyPr anchorCtr="0" anchor="t" bIns="91425" lIns="91425" rIns="91425" tIns="91425">
+            <a:noAutofit/>
+          </a:bodyPr>
+          <a:lstStyle/>
+          <a:p>
+            <a:pPr lvl="0" rtl="0">
+              <a:spcBef>
+                <a:spcPts val="0"/>
+              </a:spcBef>
+              <a:buNone/>
+            </a:pPr>
+            <a:r>
+              <a:t/>
+            </a:r>
+            <a:endParaRPr/>
+          </a:p>
+        </p:txBody>
+      </p:sp>
+    </p:spTree>
+  </p:cSld>
+  <p:clrMapOvr>
+    <a:masterClrMapping/>
+  </p:clrMapOvr>
+</p:notes>
+</file>
+
+<file path=ppt/notesSlides/notesSlide9.xml><?xml version="1.0" encoding="utf-8"?>
+<p:notes xmlns:a="http://schemas.openxmlformats.org/drawingml/2006/main" xmlns:r="http://schemas.openxmlformats.org/officeDocument/2006/relationships" xmlns:mc="http://schemas.openxmlformats.org/markup-compatibility/2006" xmlns:mv="urn:schemas-microsoft-com:mac:vml" xmlns:p="http://schemas.openxmlformats.org/presentationml/2006/main" xmlns:c="http://schemas.openxmlformats.org/drawingml/2006/chart" xmlns:dgm="http://schemas.openxmlformats.org/drawingml/2006/diagram" xmlns:o="urn:schemas-microsoft-com:office:office" xmlns:v="urn:schemas-microsoft-com:vml" xmlns:pvml="urn:schemas-microsoft-com:office:powerpoint" xmlns:com="http://schemas.openxmlformats.org/drawingml/2006/compatibility" xmlns:p14="http://schemas.microsoft.com/office/powerpoint/2010/main" showMasterPhAnim="0" showMasterSp="0">
+  <p:cSld>
+    <p:spTree>
+      <p:nvGrpSpPr>
+        <p:cNvPr id="87" name="Shape 87"/>
+        <p:cNvGrpSpPr/>
+        <p:nvPr/>
+      </p:nvGrpSpPr>
+      <p:grpSpPr>
+        <a:xfrm>
+          <a:off x="0" y="0"/>
+          <a:ext cx="0" cy="0"/>
+          <a:chOff x="0" y="0"/>
+          <a:chExt cx="0" cy="0"/>
+        </a:xfrm>
+      </p:grpSpPr>
+      <p:sp>
+        <p:nvSpPr>
+          <p:cNvPr id="88" name="Shape 88"/>
+          <p:cNvSpPr/>
+          <p:nvPr>
+            <p:ph idx="2" type="sldImg"/>
+          </p:nvPr>
+        </p:nvSpPr>
+        <p:spPr>
+          <a:xfrm>
+            <a:off x="381187" y="685800"/>
+            <a:ext cx="6096299" cy="3429000"/>
+          </a:xfrm>
+          <a:custGeom>
+            <a:pathLst>
+              <a:path extrusionOk="0" h="120000" w="120000">
+                <a:moveTo>
+                  <a:pt x="0" y="0"/>
+                </a:moveTo>
+                <a:lnTo>
+                  <a:pt x="120000" y="0"/>
+                </a:lnTo>
+                <a:lnTo>
+                  <a:pt x="120000" y="120000"/>
+                </a:lnTo>
+                <a:lnTo>
+                  <a:pt x="0" y="120000"/>
+                </a:lnTo>
+                <a:close/>
+              </a:path>
+            </a:pathLst>
+          </a:custGeom>
+        </p:spPr>
+      </p:sp>
+      <p:sp>
+        <p:nvSpPr>
+          <p:cNvPr id="89" name="Shape 89"/>
+          <p:cNvSpPr txBox="1"/>
+          <p:nvPr>
+            <p:ph idx="1" type="body"/>
+          </p:nvPr>
+        </p:nvSpPr>
+        <p:spPr>
+          <a:xfrm>
+            <a:off x="685800" y="4343400"/>
+            <a:ext cx="5486400" cy="4114800"/>
+          </a:xfrm>
+          <a:prstGeom prst="rect">
+            <a:avLst/>
+          </a:prstGeom>
+        </p:spPr>
+        <p:txBody>
+          <a:bodyPr anchorCtr="0" anchor="t" bIns="91425" lIns="91425" rIns="91425" tIns="91425">
+            <a:noAutofit/>
+          </a:bodyPr>
+          <a:lstStyle/>
+          <a:p>
+            <a:pPr lvl="0" rtl="0">
               <a:spcBef>
                 <a:spcPts val="0"/>
               </a:spcBef>
@@ -3072,7 +3360,7 @@
             </a:pPr>
             <a:r>
               <a:rPr lang="en" sz="2400"/>
-              <a:t>Leonardo Alves, Lucas Miller e William Gonçalves</a:t>
+              <a:t>Leonardo Alves, Lucas Müller e William Gonçalves</a:t>
             </a:r>
           </a:p>
         </p:txBody>
@@ -3093,7 +3381,7 @@
         </p:blipFill>
         <p:spPr>
           <a:xfrm>
-            <a:off x="3765775" y="3454050"/>
+            <a:off x="3765775" y="3530250"/>
             <a:ext cx="1612450" cy="1612450"/>
           </a:xfrm>
           <a:prstGeom prst="rect">
@@ -3123,6 +3411,141 @@
           <a:xfrm>
             <a:off x="86800" y="397548"/>
             <a:ext cx="4387525" cy="2551074"/>
+          </a:xfrm>
+          <a:prstGeom prst="rect">
+            <a:avLst/>
+          </a:prstGeom>
+          <a:noFill/>
+          <a:ln>
+            <a:noFill/>
+          </a:ln>
+        </p:spPr>
+      </p:pic>
+    </p:spTree>
+  </p:cSld>
+  <p:clrMapOvr>
+    <a:masterClrMapping/>
+  </p:clrMapOvr>
+</p:sld>
+</file>
+
+<file path=ppt/slides/slide10.xml><?xml version="1.0" encoding="utf-8"?>
+<p:sld xmlns:a="http://schemas.openxmlformats.org/drawingml/2006/main" xmlns:r="http://schemas.openxmlformats.org/officeDocument/2006/relationships" xmlns:mc="http://schemas.openxmlformats.org/markup-compatibility/2006" xmlns:mv="urn:schemas-microsoft-com:mac:vml" xmlns:p="http://schemas.openxmlformats.org/presentationml/2006/main" xmlns:c="http://schemas.openxmlformats.org/drawingml/2006/chart" xmlns:dgm="http://schemas.openxmlformats.org/drawingml/2006/diagram" xmlns:o="urn:schemas-microsoft-com:office:office" xmlns:v="urn:schemas-microsoft-com:vml" xmlns:pvml="urn:schemas-microsoft-com:office:powerpoint" xmlns:com="http://schemas.openxmlformats.org/drawingml/2006/compatibility" xmlns:p14="http://schemas.microsoft.com/office/powerpoint/2010/main">
+  <p:cSld>
+    <p:spTree>
+      <p:nvGrpSpPr>
+        <p:cNvPr id="97" name="Shape 97"/>
+        <p:cNvGrpSpPr/>
+        <p:nvPr/>
+      </p:nvGrpSpPr>
+      <p:grpSpPr>
+        <a:xfrm>
+          <a:off x="0" y="0"/>
+          <a:ext cx="0" cy="0"/>
+          <a:chOff x="0" y="0"/>
+          <a:chExt cx="0" cy="0"/>
+        </a:xfrm>
+      </p:grpSpPr>
+      <p:sp>
+        <p:nvSpPr>
+          <p:cNvPr id="98" name="Shape 98"/>
+          <p:cNvSpPr txBox="1"/>
+          <p:nvPr>
+            <p:ph type="title"/>
+          </p:nvPr>
+        </p:nvSpPr>
+        <p:spPr>
+          <a:xfrm>
+            <a:off x="457200" y="205978"/>
+            <a:ext cx="8229600" cy="857400"/>
+          </a:xfrm>
+          <a:prstGeom prst="rect">
+            <a:avLst/>
+          </a:prstGeom>
+        </p:spPr>
+        <p:txBody>
+          <a:bodyPr anchorCtr="0" anchor="b" bIns="91425" lIns="91425" rIns="91425" tIns="91425">
+            <a:noAutofit/>
+          </a:bodyPr>
+          <a:lstStyle/>
+          <a:p>
+            <a:pPr lvl="0" rtl="0">
+              <a:spcBef>
+                <a:spcPts val="0"/>
+              </a:spcBef>
+              <a:buNone/>
+            </a:pPr>
+            <a:r>
+              <a:rPr lang="en"/>
+              <a:t>Estimativas</a:t>
+            </a:r>
+          </a:p>
+        </p:txBody>
+      </p:sp>
+      <p:sp>
+        <p:nvSpPr>
+          <p:cNvPr id="99" name="Shape 99"/>
+          <p:cNvSpPr txBox="1"/>
+          <p:nvPr>
+            <p:ph idx="1" type="body"/>
+          </p:nvPr>
+        </p:nvSpPr>
+        <p:spPr>
+          <a:xfrm>
+            <a:off x="457200" y="1200150"/>
+            <a:ext cx="8229600" cy="2253899"/>
+          </a:xfrm>
+          <a:prstGeom prst="rect">
+            <a:avLst/>
+          </a:prstGeom>
+        </p:spPr>
+        <p:txBody>
+          <a:bodyPr anchorCtr="0" anchor="t" bIns="91425" lIns="91425" rIns="91425" tIns="91425">
+            <a:noAutofit/>
+          </a:bodyPr>
+          <a:lstStyle/>
+          <a:p>
+            <a:pPr indent="-228600" lvl="0" marL="457200" rtl="0">
+              <a:spcBef>
+                <a:spcPts val="0"/>
+              </a:spcBef>
+            </a:pPr>
+            <a:r>
+              <a:rPr lang="en"/>
+              <a:t>Estimativa de quantas telas a aplicação terá;</a:t>
+            </a:r>
+          </a:p>
+          <a:p>
+            <a:pPr indent="-228600" lvl="0" marL="457200" rtl="0">
+              <a:spcBef>
+                <a:spcPts val="0"/>
+              </a:spcBef>
+            </a:pPr>
+            <a:r>
+              <a:rPr lang="en"/>
+              <a:t>Estimativa de esforço (horas) necessário para a aplicação.</a:t>
+            </a:r>
+          </a:p>
+        </p:txBody>
+      </p:sp>
+      <p:pic>
+        <p:nvPicPr>
+          <p:cNvPr descr="AAEAAQAAAAAAAAOyAAAAJDJmYzQ3MTU2LTcyNTctNDAzMS05NjY2LTRlNDg5NDFkNjk0MQ.png" id="100" name="Shape 100"/>
+          <p:cNvPicPr preferRelativeResize="0"/>
+          <p:nvPr/>
+        </p:nvPicPr>
+        <p:blipFill>
+          <a:blip r:embed="rId3">
+            <a:alphaModFix/>
+          </a:blip>
+          <a:stretch>
+            <a:fillRect/>
+          </a:stretch>
+        </p:blipFill>
+        <p:spPr>
+          <a:xfrm>
+            <a:off x="7531550" y="3955175"/>
+            <a:ext cx="1612450" cy="1612450"/>
           </a:xfrm>
           <a:prstGeom prst="rect">
             <a:avLst/>
@@ -3611,18 +4034,15 @@
             </a:pPr>
             <a:r>
               <a:rPr lang="en"/>
-              <a:t>Caso alguem queira contratar algum plano, ele consulta a academia, que repassa os valores, assim que escolhido o plano, firma-se um contrato e dentro do contrato.</a:t>
-            </a:r>
-          </a:p>
-          <a:p>
-            <a:pPr indent="-228600" lvl="0" marL="457200">
-              <a:spcBef>
-                <a:spcPts val="0"/>
-              </a:spcBef>
-            </a:pPr>
+              <a:t>Caso </a:t>
+            </a:r>
             <a:r>
               <a:rPr lang="en"/>
-              <a:t>No momento da verificação do plano já possivel prever a quantidade de dependentes e os valores gerados a mais</a:t>
+              <a:t>alguém</a:t>
+            </a:r>
+            <a:r>
+              <a:rPr lang="en"/>
+              <a:t> queira contratar algum plano, ele consulta a academia, que repassa os valores, assim que escolhido o plano, firma-se um contrato e dentro do contrato, no momento da verificação do plano, já é possível prever a quantidade de dependentes e os valores gerados a mais.</a:t>
             </a:r>
           </a:p>
         </p:txBody>
@@ -3662,7 +4082,7 @@
         </p:nvSpPr>
         <p:spPr>
           <a:xfrm>
-            <a:off x="457200" y="205978"/>
+            <a:off x="457200" y="53578"/>
             <a:ext cx="8229600" cy="857400"/>
           </a:xfrm>
           <a:prstGeom prst="rect">
@@ -3683,49 +4103,14 @@
             </a:pPr>
             <a:r>
               <a:rPr lang="en"/>
-              <a:t>Caso de uso 2</a:t>
-            </a:r>
-          </a:p>
-        </p:txBody>
-      </p:sp>
-      <p:sp>
-        <p:nvSpPr>
-          <p:cNvPr id="64" name="Shape 64"/>
-          <p:cNvSpPr txBox="1"/>
-          <p:nvPr>
-            <p:ph idx="1" type="body"/>
-          </p:nvPr>
-        </p:nvSpPr>
-        <p:spPr>
-          <a:xfrm>
-            <a:off x="457200" y="1200150"/>
-            <a:ext cx="8229600" cy="3725699"/>
-          </a:xfrm>
-          <a:prstGeom prst="rect">
-            <a:avLst/>
-          </a:prstGeom>
-        </p:spPr>
-        <p:txBody>
-          <a:bodyPr anchorCtr="0" anchor="t" bIns="91425" lIns="91425" rIns="91425" tIns="91425">
-            <a:noAutofit/>
-          </a:bodyPr>
-          <a:lstStyle/>
-          <a:p>
-            <a:pPr indent="-228600" lvl="0" marL="457200" rtl="0">
-              <a:spcBef>
-                <a:spcPts val="0"/>
-              </a:spcBef>
-            </a:pPr>
-            <a:r>
-              <a:rPr lang="en"/>
-              <a:t>explicar / diagramar caso de uso secundário</a:t>
+              <a:t>Acesso à academia</a:t>
             </a:r>
           </a:p>
         </p:txBody>
       </p:sp>
       <p:pic>
         <p:nvPicPr>
-          <p:cNvPr descr="AAEAAQAAAAAAAAOyAAAAJDJmYzQ3MTU2LTcyNTctNDAzMS05NjY2LTRlNDg5NDFkNjk0MQ.png" id="65" name="Shape 65"/>
+          <p:cNvPr descr="AAEAAQAAAAAAAAOyAAAAJDJmYzQ3MTU2LTcyNTctNDAzMS05NjY2LTRlNDg5NDFkNjk0MQ.png" id="64" name="Shape 64"/>
           <p:cNvPicPr preferRelativeResize="0"/>
           <p:nvPr/>
         </p:nvPicPr>
@@ -3751,6 +4136,50 @@
           </a:ln>
         </p:spPr>
       </p:pic>
+      <p:sp>
+        <p:nvSpPr>
+          <p:cNvPr id="65" name="Shape 65"/>
+          <p:cNvSpPr txBox="1"/>
+          <p:nvPr>
+            <p:ph idx="1" type="body"/>
+          </p:nvPr>
+        </p:nvSpPr>
+        <p:spPr>
+          <a:xfrm>
+            <a:off x="457200" y="749950"/>
+            <a:ext cx="8229600" cy="3725700"/>
+          </a:xfrm>
+          <a:prstGeom prst="rect">
+            <a:avLst/>
+          </a:prstGeom>
+        </p:spPr>
+        <p:txBody>
+          <a:bodyPr anchorCtr="0" anchor="t" bIns="91425" lIns="91425" rIns="91425" tIns="91425">
+            <a:noAutofit/>
+          </a:bodyPr>
+          <a:lstStyle/>
+          <a:p>
+            <a:pPr indent="-406400" lvl="0" marL="457200" rtl="0">
+              <a:spcBef>
+                <a:spcPts val="0"/>
+              </a:spcBef>
+              <a:buSzPct val="100000"/>
+            </a:pPr>
+            <a:r>
+              <a:rPr lang="en" sz="2800"/>
+              <a:t>Ao </a:t>
+            </a:r>
+            <a:r>
+              <a:rPr lang="en" sz="2800"/>
+              <a:t>contratar um plano, o titular do contrato e seus dependentes previamente cadastrados automaticamente tem acesso às áreas de vigência do plano durante a duração do contrato, não podendo ultrapassar o limite semanal de acesso definido no mesmo. Para cada novo dependente, que deve ter um grau de parentesco com o titular, será cobrado um valor adicional</a:t>
+            </a:r>
+            <a:r>
+              <a:rPr lang="en" sz="2800"/>
+              <a:t> previsto no plano.</a:t>
+            </a:r>
+          </a:p>
+        </p:txBody>
+      </p:sp>
     </p:spTree>
   </p:cSld>
   <p:clrMapOvr>
@@ -3776,45 +4205,9 @@
           <a:chExt cx="0" cy="0"/>
         </a:xfrm>
       </p:grpSpPr>
-      <p:sp>
-        <p:nvSpPr>
-          <p:cNvPr id="70" name="Shape 70"/>
-          <p:cNvSpPr txBox="1"/>
-          <p:nvPr>
-            <p:ph type="title"/>
-          </p:nvPr>
-        </p:nvSpPr>
-        <p:spPr>
-          <a:xfrm>
-            <a:off x="60625" y="553600"/>
-            <a:ext cx="4219800" cy="128400"/>
-          </a:xfrm>
-          <a:prstGeom prst="rect">
-            <a:avLst/>
-          </a:prstGeom>
-        </p:spPr>
-        <p:txBody>
-          <a:bodyPr anchorCtr="0" anchor="b" bIns="91425" lIns="91425" rIns="91425" tIns="91425">
-            <a:noAutofit/>
-          </a:bodyPr>
-          <a:lstStyle/>
-          <a:p>
-            <a:pPr lvl="0" rtl="0">
-              <a:spcBef>
-                <a:spcPts val="0"/>
-              </a:spcBef>
-              <a:buNone/>
-            </a:pPr>
-            <a:r>
-              <a:rPr lang="en"/>
-              <a:t>Modelo ER</a:t>
-            </a:r>
-          </a:p>
-        </p:txBody>
-      </p:sp>
       <p:pic>
         <p:nvPicPr>
-          <p:cNvPr descr="AAEAAQAAAAAAAAOyAAAAJDJmYzQ3MTU2LTcyNTctNDAzMS05NjY2LTRlNDg5NDFkNjk0MQ.png" id="71" name="Shape 71"/>
+          <p:cNvPr id="70" name="Shape 70"/>
           <p:cNvPicPr preferRelativeResize="0"/>
           <p:nvPr/>
         </p:nvPicPr>
@@ -3828,8 +4221,8 @@
         </p:blipFill>
         <p:spPr>
           <a:xfrm>
-            <a:off x="7531550" y="3955175"/>
-            <a:ext cx="1612450" cy="1612450"/>
+            <a:off x="0" y="605800"/>
+            <a:ext cx="7620000" cy="4352925"/>
           </a:xfrm>
           <a:prstGeom prst="rect">
             <a:avLst/>
@@ -3840,9 +4233,45 @@
           </a:ln>
         </p:spPr>
       </p:pic>
+      <p:sp>
+        <p:nvSpPr>
+          <p:cNvPr id="71" name="Shape 71"/>
+          <p:cNvSpPr txBox="1"/>
+          <p:nvPr>
+            <p:ph type="title"/>
+          </p:nvPr>
+        </p:nvSpPr>
+        <p:spPr>
+          <a:xfrm>
+            <a:off x="136825" y="706000"/>
+            <a:ext cx="4219800" cy="128400"/>
+          </a:xfrm>
+          <a:prstGeom prst="rect">
+            <a:avLst/>
+          </a:prstGeom>
+        </p:spPr>
+        <p:txBody>
+          <a:bodyPr anchorCtr="0" anchor="b" bIns="91425" lIns="91425" rIns="91425" tIns="91425">
+            <a:noAutofit/>
+          </a:bodyPr>
+          <a:lstStyle/>
+          <a:p>
+            <a:pPr lvl="0" rtl="0">
+              <a:spcBef>
+                <a:spcPts val="0"/>
+              </a:spcBef>
+              <a:buNone/>
+            </a:pPr>
+            <a:r>
+              <a:rPr lang="en"/>
+              <a:t>Modelo ER</a:t>
+            </a:r>
+          </a:p>
+        </p:txBody>
+      </p:sp>
       <p:pic>
         <p:nvPicPr>
-          <p:cNvPr descr="Relational_1.png" id="72" name="Shape 72"/>
+          <p:cNvPr descr="AAEAAQAAAAAAAAOyAAAAJDJmYzQ3MTU2LTcyNTctNDAzMS05NjY2LTRlNDg5NDFkNjk0MQ.png" id="72" name="Shape 72"/>
           <p:cNvPicPr preferRelativeResize="0"/>
           <p:nvPr/>
         </p:nvPicPr>
@@ -3856,8 +4285,8 @@
         </p:blipFill>
         <p:spPr>
           <a:xfrm>
-            <a:off x="167373" y="681999"/>
-            <a:ext cx="6084125" cy="4462175"/>
+            <a:off x="7531550" y="3955175"/>
+            <a:ext cx="1612450" cy="1612450"/>
           </a:xfrm>
           <a:prstGeom prst="rect">
             <a:avLst/>
@@ -3916,15 +4345,20 @@
           </a:bodyPr>
           <a:lstStyle/>
           <a:p>
-            <a:pPr lvl="0" rtl="0">
-              <a:spcBef>
-                <a:spcPts val="0"/>
-              </a:spcBef>
+            <a:pPr lvl="0" algn="ctr">
+              <a:spcBef>
+                <a:spcPts val="0"/>
+              </a:spcBef>
+              <a:buClr>
+                <a:schemeClr val="dk1"/>
+              </a:buClr>
+              <a:buSzPct val="36666"/>
+              <a:buFont typeface="Arial"/>
               <a:buNone/>
             </a:pPr>
             <a:r>
-              <a:rPr lang="en"/>
-              <a:t>Estimativas</a:t>
+              <a:rPr lang="en" sz="3000"/>
+              <a:t>Telas de Visualização</a:t>
             </a:r>
           </a:p>
         </p:txBody>
@@ -3940,7 +4374,7 @@
         <p:spPr>
           <a:xfrm>
             <a:off x="457200" y="1200150"/>
-            <a:ext cx="8229600" cy="2253899"/>
+            <a:ext cx="8229600" cy="3725700"/>
           </a:xfrm>
           <a:prstGeom prst="rect">
             <a:avLst/>
@@ -3952,25 +4386,47 @@
           </a:bodyPr>
           <a:lstStyle/>
           <a:p>
-            <a:pPr indent="-228600" lvl="0" marL="457200" rtl="0">
+            <a:pPr indent="-228600" lvl="0" marL="457200">
               <a:spcBef>
                 <a:spcPts val="0"/>
               </a:spcBef>
             </a:pPr>
             <a:r>
               <a:rPr lang="en"/>
-              <a:t>Estimativa de quantas telas a aplicação terá;</a:t>
-            </a:r>
-          </a:p>
-          <a:p>
-            <a:pPr indent="-228600" lvl="0" marL="457200" rtl="0">
+              <a:t>Index</a:t>
+            </a:r>
+          </a:p>
+          <a:p>
+            <a:pPr indent="-228600" lvl="0" marL="457200">
               <a:spcBef>
                 <a:spcPts val="0"/>
               </a:spcBef>
             </a:pPr>
             <a:r>
               <a:rPr lang="en"/>
-              <a:t>Estimativa de esforço (horas) necessário para a aplicação.</a:t>
+              <a:t>Tela de Planos</a:t>
+            </a:r>
+          </a:p>
+          <a:p>
+            <a:pPr indent="-228600" lvl="0" marL="457200">
+              <a:spcBef>
+                <a:spcPts val="0"/>
+              </a:spcBef>
+            </a:pPr>
+            <a:r>
+              <a:rPr lang="en"/>
+              <a:t>Tela de Espaços da Academia</a:t>
+            </a:r>
+          </a:p>
+          <a:p>
+            <a:pPr indent="-228600" lvl="0" marL="457200">
+              <a:spcBef>
+                <a:spcPts val="0"/>
+              </a:spcBef>
+            </a:pPr>
+            <a:r>
+              <a:rPr lang="en"/>
+              <a:t>Tela Fale Conosco</a:t>
             </a:r>
           </a:p>
         </p:txBody>
@@ -4003,6 +4459,392 @@
           </a:ln>
         </p:spPr>
       </p:pic>
+    </p:spTree>
+  </p:cSld>
+  <p:clrMapOvr>
+    <a:masterClrMapping/>
+  </p:clrMapOvr>
+</p:sld>
+</file>
+
+<file path=ppt/slides/slide8.xml><?xml version="1.0" encoding="utf-8"?>
+<p:sld xmlns:a="http://schemas.openxmlformats.org/drawingml/2006/main" xmlns:r="http://schemas.openxmlformats.org/officeDocument/2006/relationships" xmlns:mc="http://schemas.openxmlformats.org/markup-compatibility/2006" xmlns:mv="urn:schemas-microsoft-com:mac:vml" xmlns:p="http://schemas.openxmlformats.org/presentationml/2006/main" xmlns:c="http://schemas.openxmlformats.org/drawingml/2006/chart" xmlns:dgm="http://schemas.openxmlformats.org/drawingml/2006/diagram" xmlns:o="urn:schemas-microsoft-com:office:office" xmlns:v="urn:schemas-microsoft-com:vml" xmlns:pvml="urn:schemas-microsoft-com:office:powerpoint" xmlns:com="http://schemas.openxmlformats.org/drawingml/2006/compatibility" xmlns:p14="http://schemas.microsoft.com/office/powerpoint/2010/main">
+  <p:cSld>
+    <p:spTree>
+      <p:nvGrpSpPr>
+        <p:cNvPr id="83" name="Shape 83"/>
+        <p:cNvGrpSpPr/>
+        <p:nvPr/>
+      </p:nvGrpSpPr>
+      <p:grpSpPr>
+        <a:xfrm>
+          <a:off x="0" y="0"/>
+          <a:ext cx="0" cy="0"/>
+          <a:chOff x="0" y="0"/>
+          <a:chExt cx="0" cy="0"/>
+        </a:xfrm>
+      </p:grpSpPr>
+      <p:sp>
+        <p:nvSpPr>
+          <p:cNvPr id="84" name="Shape 84"/>
+          <p:cNvSpPr txBox="1"/>
+          <p:nvPr>
+            <p:ph type="title"/>
+          </p:nvPr>
+        </p:nvSpPr>
+        <p:spPr>
+          <a:xfrm>
+            <a:off x="457200" y="205978"/>
+            <a:ext cx="8229600" cy="857400"/>
+          </a:xfrm>
+          <a:prstGeom prst="rect">
+            <a:avLst/>
+          </a:prstGeom>
+        </p:spPr>
+        <p:txBody>
+          <a:bodyPr anchorCtr="0" anchor="b" bIns="91425" lIns="91425" rIns="91425" tIns="91425">
+            <a:noAutofit/>
+          </a:bodyPr>
+          <a:lstStyle/>
+          <a:p>
+            <a:pPr lvl="0" rtl="0" algn="ctr">
+              <a:spcBef>
+                <a:spcPts val="0"/>
+              </a:spcBef>
+              <a:buNone/>
+            </a:pPr>
+            <a:r>
+              <a:rPr lang="en" sz="3000"/>
+              <a:t>Telas de Gerenciamento: Usuário</a:t>
+            </a:r>
+          </a:p>
+        </p:txBody>
+      </p:sp>
+      <p:sp>
+        <p:nvSpPr>
+          <p:cNvPr id="85" name="Shape 85"/>
+          <p:cNvSpPr txBox="1"/>
+          <p:nvPr>
+            <p:ph idx="1" type="body"/>
+          </p:nvPr>
+        </p:nvSpPr>
+        <p:spPr>
+          <a:xfrm>
+            <a:off x="457200" y="1200150"/>
+            <a:ext cx="8229600" cy="3725700"/>
+          </a:xfrm>
+          <a:prstGeom prst="rect">
+            <a:avLst/>
+          </a:prstGeom>
+        </p:spPr>
+        <p:txBody>
+          <a:bodyPr anchorCtr="0" anchor="t" bIns="91425" lIns="91425" rIns="91425" tIns="91425">
+            <a:noAutofit/>
+          </a:bodyPr>
+          <a:lstStyle/>
+          <a:p>
+            <a:pPr indent="-228600" lvl="0" marL="457200">
+              <a:spcBef>
+                <a:spcPts val="0"/>
+              </a:spcBef>
+            </a:pPr>
+            <a:r>
+              <a:rPr lang="en"/>
+              <a:t>Tela de Login</a:t>
+            </a:r>
+          </a:p>
+          <a:p>
+            <a:pPr indent="-228600" lvl="0" marL="457200">
+              <a:spcBef>
+                <a:spcPts val="0"/>
+              </a:spcBef>
+            </a:pPr>
+            <a:r>
+              <a:rPr lang="en"/>
+              <a:t>Tela de Cadastro</a:t>
+            </a:r>
+          </a:p>
+          <a:p>
+            <a:pPr indent="-228600" lvl="0" marL="457200">
+              <a:spcBef>
+                <a:spcPts val="0"/>
+              </a:spcBef>
+            </a:pPr>
+            <a:r>
+              <a:rPr lang="en"/>
+              <a:t>Tela de Mensalidades</a:t>
+            </a:r>
+          </a:p>
+          <a:p>
+            <a:pPr indent="-228600" lvl="0" marL="457200">
+              <a:spcBef>
+                <a:spcPts val="0"/>
+              </a:spcBef>
+            </a:pPr>
+            <a:r>
+              <a:rPr lang="en"/>
+              <a:t>Tela de Contratos</a:t>
+            </a:r>
+          </a:p>
+          <a:p>
+            <a:pPr indent="-228600" lvl="0" marL="457200">
+              <a:spcBef>
+                <a:spcPts val="0"/>
+              </a:spcBef>
+            </a:pPr>
+            <a:r>
+              <a:rPr lang="en"/>
+              <a:t>Tela de Registro de Entradas/Saidas (Usuario e dependentes)</a:t>
+            </a:r>
+          </a:p>
+          <a:p>
+            <a:pPr indent="-228600" lvl="0" marL="457200">
+              <a:spcBef>
+                <a:spcPts val="0"/>
+              </a:spcBef>
+            </a:pPr>
+            <a:r>
+              <a:rPr lang="en"/>
+              <a:t>Tela de Configurações Gerais (Nome, Endereço, etc)</a:t>
+            </a:r>
+          </a:p>
+          <a:p>
+            <a:pPr lvl="0" rtl="0">
+              <a:spcBef>
+                <a:spcPts val="0"/>
+              </a:spcBef>
+              <a:buNone/>
+            </a:pPr>
+            <a:r>
+              <a:t/>
+            </a:r>
+            <a:endParaRPr/>
+          </a:p>
+        </p:txBody>
+      </p:sp>
+      <p:pic>
+        <p:nvPicPr>
+          <p:cNvPr descr="AAEAAQAAAAAAAAOyAAAAJDJmYzQ3MTU2LTcyNTctNDAzMS05NjY2LTRlNDg5NDFkNjk0MQ.png" id="86" name="Shape 86"/>
+          <p:cNvPicPr preferRelativeResize="0"/>
+          <p:nvPr/>
+        </p:nvPicPr>
+        <p:blipFill>
+          <a:blip r:embed="rId3">
+            <a:alphaModFix/>
+          </a:blip>
+          <a:stretch>
+            <a:fillRect/>
+          </a:stretch>
+        </p:blipFill>
+        <p:spPr>
+          <a:xfrm>
+            <a:off x="7531550" y="3955175"/>
+            <a:ext cx="1612450" cy="1612450"/>
+          </a:xfrm>
+          <a:prstGeom prst="rect">
+            <a:avLst/>
+          </a:prstGeom>
+          <a:noFill/>
+          <a:ln>
+            <a:noFill/>
+          </a:ln>
+        </p:spPr>
+      </p:pic>
+    </p:spTree>
+  </p:cSld>
+  <p:clrMapOvr>
+    <a:masterClrMapping/>
+  </p:clrMapOvr>
+</p:sld>
+</file>
+
+<file path=ppt/slides/slide9.xml><?xml version="1.0" encoding="utf-8"?>
+<p:sld xmlns:a="http://schemas.openxmlformats.org/drawingml/2006/main" xmlns:r="http://schemas.openxmlformats.org/officeDocument/2006/relationships" xmlns:mc="http://schemas.openxmlformats.org/markup-compatibility/2006" xmlns:mv="urn:schemas-microsoft-com:mac:vml" xmlns:p="http://schemas.openxmlformats.org/presentationml/2006/main" xmlns:c="http://schemas.openxmlformats.org/drawingml/2006/chart" xmlns:dgm="http://schemas.openxmlformats.org/drawingml/2006/diagram" xmlns:o="urn:schemas-microsoft-com:office:office" xmlns:v="urn:schemas-microsoft-com:vml" xmlns:pvml="urn:schemas-microsoft-com:office:powerpoint" xmlns:com="http://schemas.openxmlformats.org/drawingml/2006/compatibility" xmlns:p14="http://schemas.microsoft.com/office/powerpoint/2010/main">
+  <p:cSld>
+    <p:spTree>
+      <p:nvGrpSpPr>
+        <p:cNvPr id="90" name="Shape 90"/>
+        <p:cNvGrpSpPr/>
+        <p:nvPr/>
+      </p:nvGrpSpPr>
+      <p:grpSpPr>
+        <a:xfrm>
+          <a:off x="0" y="0"/>
+          <a:ext cx="0" cy="0"/>
+          <a:chOff x="0" y="0"/>
+          <a:chExt cx="0" cy="0"/>
+        </a:xfrm>
+      </p:grpSpPr>
+      <p:pic>
+        <p:nvPicPr>
+          <p:cNvPr descr="AAEAAQAAAAAAAAOyAAAAJDJmYzQ3MTU2LTcyNTctNDAzMS05NjY2LTRlNDg5NDFkNjk0MQ.png" id="91" name="Shape 91"/>
+          <p:cNvPicPr preferRelativeResize="0"/>
+          <p:nvPr/>
+        </p:nvPicPr>
+        <p:blipFill>
+          <a:blip r:embed="rId3">
+            <a:alphaModFix/>
+          </a:blip>
+          <a:stretch>
+            <a:fillRect/>
+          </a:stretch>
+        </p:blipFill>
+        <p:spPr>
+          <a:xfrm>
+            <a:off x="7531550" y="3955175"/>
+            <a:ext cx="1612450" cy="1612450"/>
+          </a:xfrm>
+          <a:prstGeom prst="rect">
+            <a:avLst/>
+          </a:prstGeom>
+          <a:noFill/>
+          <a:ln>
+            <a:noFill/>
+          </a:ln>
+        </p:spPr>
+      </p:pic>
+      <p:sp>
+        <p:nvSpPr>
+          <p:cNvPr id="92" name="Shape 92"/>
+          <p:cNvSpPr txBox="1"/>
+          <p:nvPr>
+            <p:ph type="title"/>
+          </p:nvPr>
+        </p:nvSpPr>
+        <p:spPr>
+          <a:xfrm>
+            <a:off x="457200" y="205978"/>
+            <a:ext cx="8229600" cy="857400"/>
+          </a:xfrm>
+          <a:prstGeom prst="rect">
+            <a:avLst/>
+          </a:prstGeom>
+        </p:spPr>
+        <p:txBody>
+          <a:bodyPr anchorCtr="0" anchor="b" bIns="91425" lIns="91425" rIns="91425" tIns="91425">
+            <a:noAutofit/>
+          </a:bodyPr>
+          <a:lstStyle/>
+          <a:p>
+            <a:pPr lvl="0" rtl="0" algn="ctr">
+              <a:spcBef>
+                <a:spcPts val="0"/>
+              </a:spcBef>
+              <a:buNone/>
+            </a:pPr>
+            <a:r>
+              <a:rPr lang="en" sz="3000"/>
+              <a:t>Telas de Gerenciamento: Administrador</a:t>
+            </a:r>
+          </a:p>
+        </p:txBody>
+      </p:sp>
+      <p:sp>
+        <p:nvSpPr>
+          <p:cNvPr id="93" name="Shape 93"/>
+          <p:cNvSpPr txBox="1"/>
+          <p:nvPr>
+            <p:ph idx="1" type="body"/>
+          </p:nvPr>
+        </p:nvSpPr>
+        <p:spPr>
+          <a:xfrm>
+            <a:off x="457200" y="1200150"/>
+            <a:ext cx="8229600" cy="3725700"/>
+          </a:xfrm>
+          <a:prstGeom prst="rect">
+            <a:avLst/>
+          </a:prstGeom>
+          <a:ln>
+            <a:noFill/>
+          </a:ln>
+        </p:spPr>
+        <p:txBody>
+          <a:bodyPr anchorCtr="0" anchor="t" bIns="91425" lIns="91425" rIns="91425" tIns="91425">
+            <a:noAutofit/>
+          </a:bodyPr>
+          <a:lstStyle/>
+          <a:p>
+            <a:pPr indent="-228600" lvl="0" marL="457200">
+              <a:spcBef>
+                <a:spcPts val="0"/>
+              </a:spcBef>
+            </a:pPr>
+            <a:r>
+              <a:rPr lang="en"/>
+              <a:t>Tela Gerenciamento de Clientes</a:t>
+            </a:r>
+          </a:p>
+          <a:p>
+            <a:pPr indent="-228600" lvl="0" marL="457200">
+              <a:spcBef>
+                <a:spcPts val="0"/>
+              </a:spcBef>
+            </a:pPr>
+            <a:r>
+              <a:rPr lang="en"/>
+              <a:t>Tela de Registro de Entradas/Saídas de Clientes</a:t>
+            </a:r>
+          </a:p>
+          <a:p>
+            <a:pPr indent="-228600" lvl="0" marL="457200" rtl="0">
+              <a:spcBef>
+                <a:spcPts val="0"/>
+              </a:spcBef>
+            </a:pPr>
+            <a:r>
+              <a:rPr lang="en"/>
+              <a:t>Tela de Planos (Ex: Cadastramento de novos planos)</a:t>
+            </a:r>
+          </a:p>
+          <a:p>
+            <a:pPr indent="-228600" lvl="0" marL="457200" rtl="0">
+              <a:spcBef>
+                <a:spcPts val="0"/>
+              </a:spcBef>
+            </a:pPr>
+            <a:r>
+              <a:rPr lang="en"/>
+              <a:t>Tela de Contratos</a:t>
+            </a:r>
+          </a:p>
+          <a:p>
+            <a:pPr lvl="0" rtl="0">
+              <a:spcBef>
+                <a:spcPts val="0"/>
+              </a:spcBef>
+              <a:buNone/>
+            </a:pPr>
+            <a:r>
+              <a:t/>
+            </a:r>
+            <a:endParaRPr/>
+          </a:p>
+          <a:p>
+            <a:pPr lvl="0" rtl="0">
+              <a:spcBef>
+                <a:spcPts val="0"/>
+              </a:spcBef>
+              <a:buNone/>
+            </a:pPr>
+            <a:r>
+              <a:t/>
+            </a:r>
+            <a:endParaRPr/>
+          </a:p>
+          <a:p>
+            <a:pPr indent="-228600" lvl="0" marL="457200" rtl="0">
+              <a:spcBef>
+                <a:spcPts val="0"/>
+              </a:spcBef>
+            </a:pPr>
+            <a:r>
+              <a:rPr lang="en" strike="sngStrike"/>
+              <a:t>Tela de Espaços da Academia (Ex: Adicionar por exemplo um novo espaço dentro da academia ou etc)</a:t>
+            </a:r>
+          </a:p>
+        </p:txBody>
+      </p:sp>
     </p:spTree>
   </p:cSld>
   <p:clrMapOvr>

</xml_diff>